<commit_message>
Week 10 LL Session
</commit_message>
<xml_diff>
--- a/session/Week7/img/프레젠테이션1.pptx
+++ b/session/Week7/img/프레젠테이션1.pptx
@@ -104,6 +104,11 @@
       </a:defRPr>
     </a:lvl9pPr>
   </p:defaultTextStyle>
+  <p:extLst>
+    <p:ext uri="{EFAFB233-063F-42B5-8137-9DF3F51BA10A}">
+      <p15:sldGuideLst xmlns:p15="http://schemas.microsoft.com/office/powerpoint/2012/main"/>
+    </p:ext>
+  </p:extLst>
 </p:presentation>
 </file>
 
@@ -254,7 +259,7 @@
           <a:p>
             <a:fld id="{E0EBB32F-3F7A-C449-96E0-6FFD87F35F7B}" type="datetimeFigureOut">
               <a:rPr kumimoji="1" lang="ko-KR" altLang="en-US" smtClean="0"/>
-              <a:t>2022. 5. 22.</a:t>
+              <a:t>2022. 6. 11.</a:t>
             </a:fld>
             <a:endParaRPr kumimoji="1" lang="ko-KR" altLang="en-US"/>
           </a:p>
@@ -452,7 +457,7 @@
           <a:p>
             <a:fld id="{E0EBB32F-3F7A-C449-96E0-6FFD87F35F7B}" type="datetimeFigureOut">
               <a:rPr kumimoji="1" lang="ko-KR" altLang="en-US" smtClean="0"/>
-              <a:t>2022. 5. 22.</a:t>
+              <a:t>2022. 6. 11.</a:t>
             </a:fld>
             <a:endParaRPr kumimoji="1" lang="ko-KR" altLang="en-US"/>
           </a:p>
@@ -660,7 +665,7 @@
           <a:p>
             <a:fld id="{E0EBB32F-3F7A-C449-96E0-6FFD87F35F7B}" type="datetimeFigureOut">
               <a:rPr kumimoji="1" lang="ko-KR" altLang="en-US" smtClean="0"/>
-              <a:t>2022. 5. 22.</a:t>
+              <a:t>2022. 6. 11.</a:t>
             </a:fld>
             <a:endParaRPr kumimoji="1" lang="ko-KR" altLang="en-US"/>
           </a:p>
@@ -858,7 +863,7 @@
           <a:p>
             <a:fld id="{E0EBB32F-3F7A-C449-96E0-6FFD87F35F7B}" type="datetimeFigureOut">
               <a:rPr kumimoji="1" lang="ko-KR" altLang="en-US" smtClean="0"/>
-              <a:t>2022. 5. 22.</a:t>
+              <a:t>2022. 6. 11.</a:t>
             </a:fld>
             <a:endParaRPr kumimoji="1" lang="ko-KR" altLang="en-US"/>
           </a:p>
@@ -1133,7 +1138,7 @@
           <a:p>
             <a:fld id="{E0EBB32F-3F7A-C449-96E0-6FFD87F35F7B}" type="datetimeFigureOut">
               <a:rPr kumimoji="1" lang="ko-KR" altLang="en-US" smtClean="0"/>
-              <a:t>2022. 5. 22.</a:t>
+              <a:t>2022. 6. 11.</a:t>
             </a:fld>
             <a:endParaRPr kumimoji="1" lang="ko-KR" altLang="en-US"/>
           </a:p>
@@ -1398,7 +1403,7 @@
           <a:p>
             <a:fld id="{E0EBB32F-3F7A-C449-96E0-6FFD87F35F7B}" type="datetimeFigureOut">
               <a:rPr kumimoji="1" lang="ko-KR" altLang="en-US" smtClean="0"/>
-              <a:t>2022. 5. 22.</a:t>
+              <a:t>2022. 6. 11.</a:t>
             </a:fld>
             <a:endParaRPr kumimoji="1" lang="ko-KR" altLang="en-US"/>
           </a:p>
@@ -1810,7 +1815,7 @@
           <a:p>
             <a:fld id="{E0EBB32F-3F7A-C449-96E0-6FFD87F35F7B}" type="datetimeFigureOut">
               <a:rPr kumimoji="1" lang="ko-KR" altLang="en-US" smtClean="0"/>
-              <a:t>2022. 5. 22.</a:t>
+              <a:t>2022. 6. 11.</a:t>
             </a:fld>
             <a:endParaRPr kumimoji="1" lang="ko-KR" altLang="en-US"/>
           </a:p>
@@ -1951,7 +1956,7 @@
           <a:p>
             <a:fld id="{E0EBB32F-3F7A-C449-96E0-6FFD87F35F7B}" type="datetimeFigureOut">
               <a:rPr kumimoji="1" lang="ko-KR" altLang="en-US" smtClean="0"/>
-              <a:t>2022. 5. 22.</a:t>
+              <a:t>2022. 6. 11.</a:t>
             </a:fld>
             <a:endParaRPr kumimoji="1" lang="ko-KR" altLang="en-US"/>
           </a:p>
@@ -2064,7 +2069,7 @@
           <a:p>
             <a:fld id="{E0EBB32F-3F7A-C449-96E0-6FFD87F35F7B}" type="datetimeFigureOut">
               <a:rPr kumimoji="1" lang="ko-KR" altLang="en-US" smtClean="0"/>
-              <a:t>2022. 5. 22.</a:t>
+              <a:t>2022. 6. 11.</a:t>
             </a:fld>
             <a:endParaRPr kumimoji="1" lang="ko-KR" altLang="en-US"/>
           </a:p>
@@ -2375,7 +2380,7 @@
           <a:p>
             <a:fld id="{E0EBB32F-3F7A-C449-96E0-6FFD87F35F7B}" type="datetimeFigureOut">
               <a:rPr kumimoji="1" lang="ko-KR" altLang="en-US" smtClean="0"/>
-              <a:t>2022. 5. 22.</a:t>
+              <a:t>2022. 6. 11.</a:t>
             </a:fld>
             <a:endParaRPr kumimoji="1" lang="ko-KR" altLang="en-US"/>
           </a:p>
@@ -2663,7 +2668,7 @@
           <a:p>
             <a:fld id="{E0EBB32F-3F7A-C449-96E0-6FFD87F35F7B}" type="datetimeFigureOut">
               <a:rPr kumimoji="1" lang="ko-KR" altLang="en-US" smtClean="0"/>
-              <a:t>2022. 5. 22.</a:t>
+              <a:t>2022. 6. 11.</a:t>
             </a:fld>
             <a:endParaRPr kumimoji="1" lang="ko-KR" altLang="en-US"/>
           </a:p>
@@ -2904,7 +2909,7 @@
           <a:p>
             <a:fld id="{E0EBB32F-3F7A-C449-96E0-6FFD87F35F7B}" type="datetimeFigureOut">
               <a:rPr kumimoji="1" lang="ko-KR" altLang="en-US" smtClean="0"/>
-              <a:t>2022. 5. 22.</a:t>
+              <a:t>2022. 6. 11.</a:t>
             </a:fld>
             <a:endParaRPr kumimoji="1" lang="ko-KR" altLang="en-US"/>
           </a:p>
@@ -3335,10 +3340,10 @@
         </p:nvGrpSpPr>
         <p:grpSpPr>
           <a:xfrm>
-            <a:off x="1748145" y="69636"/>
-            <a:ext cx="8702999" cy="6698912"/>
-            <a:chOff x="1748145" y="69636"/>
-            <a:chExt cx="8702999" cy="6698912"/>
+            <a:off x="346841" y="69636"/>
+            <a:ext cx="10878207" cy="6564936"/>
+            <a:chOff x="346841" y="69636"/>
+            <a:chExt cx="10878207" cy="6564936"/>
           </a:xfrm>
         </p:grpSpPr>
         <p:sp>
@@ -3355,8 +3360,8 @@
           </p:nvSpPr>
           <p:spPr>
             <a:xfrm>
-              <a:off x="1748145" y="2193609"/>
-              <a:ext cx="1734208" cy="1776248"/>
+              <a:off x="346841" y="2483990"/>
+              <a:ext cx="3135512" cy="1195485"/>
             </a:xfrm>
             <a:prstGeom prst="roundRect">
               <a:avLst/>
@@ -3390,14 +3395,14 @@
             <a:p>
               <a:pPr algn="ctr"/>
               <a:r>
-                <a:rPr kumimoji="1" lang="en-US" altLang="ko-KR" sz="3600" b="1" dirty="0">
+                <a:rPr kumimoji="1" lang="en-US" altLang="ko-KR" sz="2400" b="1" dirty="0" err="1">
                   <a:solidFill>
                     <a:schemeClr val="tx1"/>
                   </a:solidFill>
                 </a:rPr>
-                <a:t>Client</a:t>
+                <a:t>HttpUrlConnection</a:t>
               </a:r>
-              <a:endParaRPr kumimoji="1" lang="ko-KR" altLang="en-US" sz="3600" b="1" dirty="0">
+              <a:endParaRPr kumimoji="1" lang="ko-KR" altLang="en-US" sz="2400" b="1" dirty="0">
                 <a:solidFill>
                   <a:schemeClr val="tx1"/>
                 </a:solidFill>
@@ -3419,8 +3424,8 @@
           </p:nvSpPr>
           <p:spPr>
             <a:xfrm>
-              <a:off x="8716935" y="2193609"/>
-              <a:ext cx="1734208" cy="1776248"/>
+              <a:off x="8716934" y="2193609"/>
+              <a:ext cx="2508113" cy="1776248"/>
             </a:xfrm>
             <a:prstGeom prst="roundRect">
               <a:avLst/>
@@ -3453,14 +3458,6 @@
             <a:lstStyle/>
             <a:p>
               <a:pPr algn="ctr"/>
-              <a:r>
-                <a:rPr kumimoji="1" lang="en-US" altLang="ko-KR" sz="3600" b="1" dirty="0">
-                  <a:solidFill>
-                    <a:schemeClr val="tx1"/>
-                  </a:solidFill>
-                </a:rPr>
-                <a:t>Server</a:t>
-              </a:r>
               <a:endParaRPr kumimoji="1" lang="ko-KR" altLang="en-US" sz="3600" b="1" dirty="0">
                 <a:solidFill>
                   <a:schemeClr val="tx1"/>
@@ -3814,7 +3811,7 @@
                     <a:schemeClr val="tx1"/>
                   </a:solidFill>
                 </a:rPr>
-                <a:t>200, 400, 404, 500</a:t>
+                <a:t>200</a:t>
               </a:r>
               <a:endParaRPr kumimoji="1" lang="ko-KR" altLang="en-US" dirty="0">
                 <a:solidFill>
@@ -3881,134 +3878,6 @@
                 <a:t>Data</a:t>
               </a:r>
               <a:endParaRPr kumimoji="1" lang="ko-KR" altLang="en-US" dirty="0">
-                <a:solidFill>
-                  <a:schemeClr val="tx1"/>
-                </a:solidFill>
-              </a:endParaRPr>
-            </a:p>
-          </p:txBody>
-        </p:sp>
-        <p:sp>
-          <p:nvSpPr>
-            <p:cNvPr id="28" name="직사각형 27">
-              <a:extLst>
-                <a:ext uri="{FF2B5EF4-FFF2-40B4-BE49-F238E27FC236}">
-                  <a16:creationId xmlns:a16="http://schemas.microsoft.com/office/drawing/2014/main" id="{2E1D802E-7B90-444F-9C73-9C804602C7C4}"/>
-                </a:ext>
-              </a:extLst>
-            </p:cNvPr>
-            <p:cNvSpPr/>
-            <p:nvPr/>
-          </p:nvSpPr>
-          <p:spPr>
-            <a:xfrm>
-              <a:off x="6198704" y="5996570"/>
-              <a:ext cx="2222707" cy="638002"/>
-            </a:xfrm>
-            <a:prstGeom prst="rect">
-              <a:avLst/>
-            </a:prstGeom>
-            <a:noFill/>
-            <a:ln w="6350">
-              <a:solidFill>
-                <a:schemeClr val="tx1"/>
-              </a:solidFill>
-            </a:ln>
-          </p:spPr>
-          <p:style>
-            <a:lnRef idx="2">
-              <a:schemeClr val="accent1">
-                <a:shade val="50000"/>
-              </a:schemeClr>
-            </a:lnRef>
-            <a:fillRef idx="1">
-              <a:schemeClr val="accent1"/>
-            </a:fillRef>
-            <a:effectRef idx="0">
-              <a:schemeClr val="accent1"/>
-            </a:effectRef>
-            <a:fontRef idx="minor">
-              <a:schemeClr val="lt1"/>
-            </a:fontRef>
-          </p:style>
-          <p:txBody>
-            <a:bodyPr rtlCol="0" anchor="ctr"/>
-            <a:lstStyle/>
-            <a:p>
-              <a:pPr algn="ctr"/>
-              <a:r>
-                <a:rPr kumimoji="1" lang="ko-KR" altLang="en-US" sz="1400" dirty="0">
-                  <a:solidFill>
-                    <a:schemeClr val="tx1"/>
-                  </a:solidFill>
-                </a:rPr>
-                <a:t>이름</a:t>
-              </a:r>
-              <a:r>
-                <a:rPr kumimoji="1" lang="en-US" altLang="ko-KR" sz="1400" dirty="0">
-                  <a:solidFill>
-                    <a:schemeClr val="tx1"/>
-                  </a:solidFill>
-                </a:rPr>
-                <a:t>,</a:t>
-              </a:r>
-              <a:r>
-                <a:rPr kumimoji="1" lang="ko-KR" altLang="en-US" sz="1400" dirty="0">
-                  <a:solidFill>
-                    <a:schemeClr val="tx1"/>
-                  </a:solidFill>
-                </a:rPr>
-                <a:t> 나이</a:t>
-              </a:r>
-              <a:r>
-                <a:rPr kumimoji="1" lang="en-US" altLang="ko-KR" sz="1400" dirty="0">
-                  <a:solidFill>
-                    <a:schemeClr val="tx1"/>
-                  </a:solidFill>
-                </a:rPr>
-                <a:t>,</a:t>
-              </a:r>
-              <a:r>
-                <a:rPr kumimoji="1" lang="ko-KR" altLang="en-US" sz="1400" dirty="0">
-                  <a:solidFill>
-                    <a:schemeClr val="tx1"/>
-                  </a:solidFill>
-                </a:rPr>
-                <a:t> </a:t>
-              </a:r>
-              <a:r>
-                <a:rPr kumimoji="1" lang="en-US" altLang="ko-KR" sz="1400" dirty="0">
-                  <a:solidFill>
-                    <a:schemeClr val="tx1"/>
-                  </a:solidFill>
-                </a:rPr>
-                <a:t>…</a:t>
-              </a:r>
-              <a:r>
-                <a:rPr kumimoji="1" lang="ko-KR" altLang="en-US" sz="1400" dirty="0">
-                  <a:solidFill>
-                    <a:schemeClr val="tx1"/>
-                  </a:solidFill>
-                </a:rPr>
-                <a:t> </a:t>
-              </a:r>
-              <a:endParaRPr kumimoji="1" lang="en-US" altLang="ko-KR" sz="1400" dirty="0">
-                <a:solidFill>
-                  <a:schemeClr val="tx1"/>
-                </a:solidFill>
-              </a:endParaRPr>
-            </a:p>
-            <a:p>
-              <a:pPr algn="ctr"/>
-              <a:r>
-                <a:rPr kumimoji="1" lang="en-US" altLang="ko-KR" sz="1400" dirty="0">
-                  <a:solidFill>
-                    <a:schemeClr val="tx1"/>
-                  </a:solidFill>
-                </a:rPr>
-                <a:t>(Application dependence)</a:t>
-              </a:r>
-              <a:endParaRPr kumimoji="1" lang="ko-KR" altLang="en-US" sz="1400" dirty="0">
                 <a:solidFill>
                   <a:schemeClr val="tx1"/>
                 </a:solidFill>
@@ -4101,9 +3970,9 @@
               <a:avLst/>
             </a:prstGeom>
             <a:noFill/>
-            <a:ln w="6350">
+            <a:ln w="38100">
               <a:solidFill>
-                <a:schemeClr val="tx1"/>
+                <a:srgbClr val="00B0F0"/>
               </a:solidFill>
             </a:ln>
           </p:spPr>
@@ -4127,40 +3996,95 @@
             <a:bodyPr rtlCol="0" anchor="ctr"/>
             <a:lstStyle/>
             <a:p>
-              <a:pPr algn="ctr"/>
               <a:r>
-                <a:rPr kumimoji="1" lang="en-US" altLang="ko-KR" sz="1200" dirty="0">
+                <a:rPr kumimoji="1" lang="en-US" altLang="ko-KR" sz="1400" b="1" dirty="0" err="1">
                   <a:solidFill>
-                    <a:schemeClr val="tx1"/>
+                    <a:srgbClr val="00B0F0"/>
                   </a:solidFill>
                 </a:rPr>
-                <a:t>Path Parameter, </a:t>
+                <a:t>lat</a:t>
               </a:r>
+              <a:r>
+                <a:rPr kumimoji="1" lang="en-US" altLang="ko-KR" sz="1400" b="1" dirty="0">
+                  <a:solidFill>
+                    <a:srgbClr val="00B0F0"/>
+                  </a:solidFill>
+                </a:rPr>
+                <a:t> : </a:t>
+              </a:r>
+              <a:r>
+                <a:rPr kumimoji="1" lang="ko-KR" altLang="en-US" sz="1400" b="1" dirty="0">
+                  <a:solidFill>
+                    <a:srgbClr val="00B0F0"/>
+                  </a:solidFill>
+                </a:rPr>
+                <a:t>위도</a:t>
+              </a:r>
+              <a:endParaRPr kumimoji="1" lang="en-US" altLang="ko-KR" sz="1400" b="1" dirty="0">
+                <a:solidFill>
+                  <a:srgbClr val="00B0F0"/>
+                </a:solidFill>
+              </a:endParaRPr>
             </a:p>
             <a:p>
-              <a:pPr algn="ctr"/>
               <a:r>
-                <a:rPr kumimoji="1" lang="en-US" altLang="ko-KR" sz="1200" dirty="0">
+                <a:rPr kumimoji="1" lang="en-US" altLang="ko-KR" sz="1400" b="1" dirty="0" err="1">
                   <a:solidFill>
-                    <a:schemeClr val="tx1"/>
+                    <a:srgbClr val="00B0F0"/>
                   </a:solidFill>
                 </a:rPr>
-                <a:t>Query String, </a:t>
+                <a:t>lon</a:t>
               </a:r>
+              <a:r>
+                <a:rPr kumimoji="1" lang="ko-KR" altLang="en-US" sz="1400" b="1" dirty="0">
+                  <a:solidFill>
+                    <a:srgbClr val="00B0F0"/>
+                  </a:solidFill>
+                </a:rPr>
+                <a:t> </a:t>
+              </a:r>
+              <a:r>
+                <a:rPr kumimoji="1" lang="en-US" altLang="ko-KR" sz="1400" b="1" dirty="0">
+                  <a:solidFill>
+                    <a:srgbClr val="00B0F0"/>
+                  </a:solidFill>
+                </a:rPr>
+                <a:t>:</a:t>
+              </a:r>
+              <a:r>
+                <a:rPr kumimoji="1" lang="ko-KR" altLang="en-US" sz="1400" b="1" dirty="0">
+                  <a:solidFill>
+                    <a:srgbClr val="00B0F0"/>
+                  </a:solidFill>
+                </a:rPr>
+                <a:t> 경도</a:t>
+              </a:r>
+              <a:endParaRPr kumimoji="1" lang="en-US" altLang="ko-KR" sz="1400" b="1" dirty="0">
+                <a:solidFill>
+                  <a:srgbClr val="00B0F0"/>
+                </a:solidFill>
+              </a:endParaRPr>
             </a:p>
             <a:p>
-              <a:pPr algn="ctr"/>
               <a:r>
-                <a:rPr kumimoji="1" lang="en-US" altLang="ko-KR" sz="1200" dirty="0">
+                <a:rPr kumimoji="1" lang="en-US" altLang="ko-KR" sz="1400" b="1" dirty="0" err="1">
                   <a:solidFill>
-                    <a:schemeClr val="tx1"/>
+                    <a:srgbClr val="00B0F0"/>
                   </a:solidFill>
                 </a:rPr>
-                <a:t>Request Body</a:t>
+                <a:t>appid</a:t>
               </a:r>
-              <a:endParaRPr kumimoji="1" lang="ko-KR" altLang="en-US" sz="1200" dirty="0">
+              <a:r>
+                <a:rPr kumimoji="1" lang="en-US" altLang="ko-KR" sz="1400" b="1" dirty="0">
+                  <a:solidFill>
+                    <a:srgbClr val="00B0F0"/>
+                  </a:solidFill>
+                </a:rPr>
+                <a:t> : API Key</a:t>
+              </a:r>
+              <a:endParaRPr kumimoji="1" lang="ko-KR" altLang="en-US" sz="1400" b="1" dirty="0">
                 <a:solidFill>
-                  <a:schemeClr val="tx1"/>
+                  <a:srgbClr val="00B0F0"/>
                 </a:solidFill>
               </a:endParaRPr>
             </a:p>
@@ -4279,14 +4203,14 @@
             <a:p>
               <a:pPr algn="ctr"/>
               <a:r>
-                <a:rPr kumimoji="1" lang="en-US" altLang="ko-KR" sz="1200" dirty="0">
+                <a:rPr kumimoji="1" lang="en-US" altLang="ko-KR" sz="2800" dirty="0">
                   <a:solidFill>
                     <a:schemeClr val="tx1"/>
                   </a:solidFill>
                 </a:rPr>
-                <a:t>GET, POST, PATCH, PUT, …</a:t>
+                <a:t>GET</a:t>
               </a:r>
-              <a:endParaRPr kumimoji="1" lang="ko-KR" altLang="en-US" sz="1200" dirty="0">
+              <a:endParaRPr kumimoji="1" lang="ko-KR" altLang="en-US" sz="2800" dirty="0">
                 <a:solidFill>
                   <a:schemeClr val="tx1"/>
                 </a:solidFill>
@@ -4308,8 +4232,8 @@
           </p:nvSpPr>
           <p:spPr>
             <a:xfrm>
-              <a:off x="6198704" y="5296218"/>
-              <a:ext cx="2222707" cy="638002"/>
+              <a:off x="6198704" y="5296217"/>
+              <a:ext cx="2222707" cy="1333601"/>
             </a:xfrm>
             <a:prstGeom prst="rect">
               <a:avLst/>
@@ -4341,52 +4265,147 @@
             <a:bodyPr rtlCol="0" anchor="ctr"/>
             <a:lstStyle/>
             <a:p>
-              <a:pPr algn="ctr"/>
               <a:r>
-                <a:rPr kumimoji="1" lang="en-US" altLang="ko-KR" sz="1200" dirty="0">
+                <a:rPr kumimoji="1" lang="en-US" altLang="ko-KR" sz="1400" b="1" spc="-150" dirty="0">
                   <a:solidFill>
-                    <a:schemeClr val="tx1"/>
+                    <a:srgbClr val="FF0000"/>
                   </a:solidFill>
                 </a:rPr>
-                <a:t>JSON(</a:t>
+                <a:t>Weather-description:</a:t>
               </a:r>
               <a:r>
-                <a:rPr kumimoji="1" lang="ko-KR" altLang="en-US" sz="1200" dirty="0">
+                <a:rPr kumimoji="1" lang="ko-KR" altLang="en-US" sz="1400" b="1" spc="-150" dirty="0">
                   <a:solidFill>
-                    <a:schemeClr val="tx1"/>
-                  </a:solidFill>
-                </a:rPr>
-                <a:t>짱</a:t>
-              </a:r>
-              <a:r>
-                <a:rPr kumimoji="1" lang="en-US" altLang="ko-KR" sz="1200" dirty="0">
-                  <a:solidFill>
-                    <a:schemeClr val="tx1"/>
-                  </a:solidFill>
-                </a:rPr>
-                <a:t>), XML,</a:t>
-              </a:r>
-              <a:r>
-                <a:rPr kumimoji="1" lang="ko-KR" altLang="en-US" sz="1200" dirty="0">
-                  <a:solidFill>
-                    <a:schemeClr val="tx1"/>
+                    <a:srgbClr val="FF0000"/>
                   </a:solidFill>
                 </a:rPr>
                 <a:t> </a:t>
               </a:r>
               <a:r>
-                <a:rPr kumimoji="1" lang="en-US" altLang="ko-KR" sz="1200" dirty="0">
+                <a:rPr kumimoji="1" lang="ko-KR" altLang="en-US" sz="1200" b="1" spc="-150" dirty="0" err="1">
                   <a:solidFill>
-                    <a:schemeClr val="tx1"/>
+                    <a:srgbClr val="FF0000"/>
                   </a:solidFill>
                 </a:rPr>
-                <a:t>TEXT, RSS</a:t>
+                <a:t>날씨현황</a:t>
               </a:r>
-              <a:endParaRPr kumimoji="1" lang="ko-KR" altLang="en-US" sz="1200" dirty="0">
+              <a:endParaRPr kumimoji="1" lang="en-US" altLang="ko-KR" sz="1200" b="1" spc="-150" dirty="0">
                 <a:solidFill>
-                  <a:schemeClr val="tx1"/>
+                  <a:srgbClr val="FF0000"/>
                 </a:solidFill>
               </a:endParaRPr>
+            </a:p>
+            <a:p>
+              <a:r>
+                <a:rPr kumimoji="1" lang="en-US" altLang="ko-KR" sz="1400" b="1" dirty="0">
+                  <a:solidFill>
+                    <a:srgbClr val="FF0000"/>
+                  </a:solidFill>
+                </a:rPr>
+                <a:t>Temperature</a:t>
+              </a:r>
+              <a:r>
+                <a:rPr kumimoji="1" lang="ko-KR" altLang="en-US" sz="1400" b="1" dirty="0">
+                  <a:solidFill>
+                    <a:srgbClr val="FF0000"/>
+                  </a:solidFill>
+                </a:rPr>
+                <a:t> </a:t>
+              </a:r>
+              <a:r>
+                <a:rPr kumimoji="1" lang="en-US" altLang="ko-KR" sz="1400" b="1" dirty="0">
+                  <a:solidFill>
+                    <a:srgbClr val="FF0000"/>
+                  </a:solidFill>
+                </a:rPr>
+                <a:t>:</a:t>
+              </a:r>
+              <a:r>
+                <a:rPr kumimoji="1" lang="ko-KR" altLang="en-US" sz="1400" b="1" dirty="0">
+                  <a:solidFill>
+                    <a:srgbClr val="FF0000"/>
+                  </a:solidFill>
+                </a:rPr>
+                <a:t> 절대온도</a:t>
+              </a:r>
+              <a:endParaRPr kumimoji="1" lang="en-US" altLang="ko-KR" sz="1400" b="1" dirty="0">
+                <a:solidFill>
+                  <a:srgbClr val="FF0000"/>
+                </a:solidFill>
+              </a:endParaRPr>
+            </a:p>
+            <a:p>
+              <a:r>
+                <a:rPr kumimoji="1" lang="en-US" altLang="ko-KR" sz="1400" b="1" dirty="0" err="1">
+                  <a:solidFill>
+                    <a:srgbClr val="FF0000"/>
+                  </a:solidFill>
+                </a:rPr>
+                <a:t>Huminity</a:t>
+              </a:r>
+              <a:r>
+                <a:rPr kumimoji="1" lang="ko-KR" altLang="en-US" sz="1400" b="1" dirty="0">
+                  <a:solidFill>
+                    <a:srgbClr val="FF0000"/>
+                  </a:solidFill>
+                </a:rPr>
+                <a:t> </a:t>
+              </a:r>
+              <a:r>
+                <a:rPr kumimoji="1" lang="en-US" altLang="ko-KR" sz="1400" b="1" dirty="0">
+                  <a:solidFill>
+                    <a:srgbClr val="FF0000"/>
+                  </a:solidFill>
+                </a:rPr>
+                <a:t>:</a:t>
+              </a:r>
+              <a:r>
+                <a:rPr kumimoji="1" lang="ko-KR" altLang="en-US" sz="1400" b="1" dirty="0">
+                  <a:solidFill>
+                    <a:srgbClr val="FF0000"/>
+                  </a:solidFill>
+                </a:rPr>
+                <a:t> 습도</a:t>
+              </a:r>
+              <a:endParaRPr kumimoji="1" lang="en-US" altLang="ko-KR" sz="1400" b="1" dirty="0">
+                <a:solidFill>
+                  <a:srgbClr val="FF0000"/>
+                </a:solidFill>
+              </a:endParaRPr>
+            </a:p>
+            <a:p>
+              <a:r>
+                <a:rPr kumimoji="1" lang="en-US" altLang="ko-KR" sz="1400" b="1" dirty="0">
+                  <a:solidFill>
+                    <a:srgbClr val="FF0000"/>
+                  </a:solidFill>
+                </a:rPr>
+                <a:t>Feels-like</a:t>
+              </a:r>
+              <a:r>
+                <a:rPr kumimoji="1" lang="ko-KR" altLang="en-US" sz="1400" b="1" dirty="0">
+                  <a:solidFill>
+                    <a:srgbClr val="FF0000"/>
+                  </a:solidFill>
+                </a:rPr>
+                <a:t> </a:t>
+              </a:r>
+              <a:r>
+                <a:rPr kumimoji="1" lang="en-US" altLang="ko-KR" sz="1400" b="1" dirty="0">
+                  <a:solidFill>
+                    <a:srgbClr val="FF0000"/>
+                  </a:solidFill>
+                </a:rPr>
+                <a:t>:</a:t>
+              </a:r>
+              <a:r>
+                <a:rPr kumimoji="1" lang="ko-KR" altLang="en-US" sz="1400" b="1" dirty="0">
+                  <a:solidFill>
+                    <a:srgbClr val="FF0000"/>
+                  </a:solidFill>
+                </a:rPr>
+                <a:t> 체감온도</a:t>
+              </a:r>
             </a:p>
           </p:txBody>
         </p:sp>
@@ -4405,7 +4424,7 @@
           <p:spPr>
             <a:xfrm>
               <a:off x="3691392" y="69636"/>
-              <a:ext cx="4816504" cy="6698912"/>
+              <a:ext cx="4816504" cy="1679559"/>
             </a:xfrm>
             <a:prstGeom prst="rect">
               <a:avLst/>
@@ -4446,219 +4465,176 @@
             </a:p>
           </p:txBody>
         </p:sp>
-        <mc:AlternateContent xmlns:mc="http://schemas.openxmlformats.org/markup-compatibility/2006">
-          <mc:Choice xmlns:a14="http://schemas.microsoft.com/office/drawing/2010/main" Requires="a14">
-            <p:sp>
-              <p:nvSpPr>
-                <p:cNvPr id="41" name="직사각형 40">
-                  <a:extLst>
-                    <a:ext uri="{FF2B5EF4-FFF2-40B4-BE49-F238E27FC236}">
-                      <a16:creationId xmlns:a16="http://schemas.microsoft.com/office/drawing/2014/main" id="{5274E6AC-7DE0-9048-9092-860FE50A401B}"/>
-                    </a:ext>
-                  </a:extLst>
-                </p:cNvPr>
-                <p:cNvSpPr/>
-                <p:nvPr/>
-              </p:nvSpPr>
-              <p:spPr>
-                <a:xfrm>
-                  <a:off x="8709650" y="4504642"/>
-                  <a:ext cx="1741494" cy="2263893"/>
-                </a:xfrm>
-                <a:prstGeom prst="rect">
-                  <a:avLst/>
-                </a:prstGeom>
-                <a:noFill/>
-                <a:ln w="28575">
+        <p:sp>
+          <p:nvSpPr>
+            <p:cNvPr id="41" name="직사각형 40">
+              <a:extLst>
+                <a:ext uri="{FF2B5EF4-FFF2-40B4-BE49-F238E27FC236}">
+                  <a16:creationId xmlns:a16="http://schemas.microsoft.com/office/drawing/2014/main" id="{5274E6AC-7DE0-9048-9092-860FE50A401B}"/>
+                </a:ext>
+              </a:extLst>
+            </p:cNvPr>
+            <p:cNvSpPr/>
+            <p:nvPr/>
+          </p:nvSpPr>
+          <p:spPr>
+            <a:xfrm>
+              <a:off x="8716934" y="4058620"/>
+              <a:ext cx="2508114" cy="495628"/>
+            </a:xfrm>
+            <a:prstGeom prst="rect">
+              <a:avLst/>
+            </a:prstGeom>
+            <a:noFill/>
+            <a:ln w="28575">
+              <a:solidFill>
+                <a:srgbClr val="00B0F0"/>
+              </a:solidFill>
+            </a:ln>
+          </p:spPr>
+          <p:style>
+            <a:lnRef idx="2">
+              <a:schemeClr val="accent1">
+                <a:shade val="50000"/>
+              </a:schemeClr>
+            </a:lnRef>
+            <a:fillRef idx="1">
+              <a:schemeClr val="accent1"/>
+            </a:fillRef>
+            <a:effectRef idx="0">
+              <a:schemeClr val="accent1"/>
+            </a:effectRef>
+            <a:fontRef idx="minor">
+              <a:schemeClr val="lt1"/>
+            </a:fontRef>
+          </p:style>
+          <p:txBody>
+            <a:bodyPr rtlCol="0" anchor="ctr"/>
+            <a:lstStyle/>
+            <a:p>
+              <a:pPr algn="ctr"/>
+              <a:r>
+                <a:rPr lang="en" altLang="ko-KR" sz="1400" dirty="0">
                   <a:solidFill>
                     <a:srgbClr val="00B0F0"/>
                   </a:solidFill>
-                </a:ln>
-              </p:spPr>
-              <p:style>
-                <a:lnRef idx="2">
-                  <a:schemeClr val="accent1">
-                    <a:shade val="50000"/>
-                  </a:schemeClr>
-                </a:lnRef>
-                <a:fillRef idx="1">
-                  <a:schemeClr val="accent1"/>
-                </a:fillRef>
-                <a:effectRef idx="0">
-                  <a:schemeClr val="accent1"/>
-                </a:effectRef>
-                <a:fontRef idx="minor">
-                  <a:schemeClr val="lt1"/>
-                </a:fontRef>
-              </p:style>
-              <p:txBody>
-                <a:bodyPr rtlCol="0" anchor="ctr"/>
-                <a:lstStyle/>
-                <a:p>
-                  <a:pPr algn="ctr"/>
-                  <a:r>
-                    <a:rPr kumimoji="1" lang="en-US" altLang="ko-KR" b="1" u="sng" dirty="0">
-                      <a:solidFill>
-                        <a:srgbClr val="00B0F0"/>
-                      </a:solidFill>
-                    </a:rPr>
-                    <a:t>HTTP </a:t>
-                  </a:r>
-                </a:p>
-                <a:p>
-                  <a:pPr algn="ctr"/>
-                  <a:r>
-                    <a:rPr kumimoji="1" lang="ko-KR" altLang="en-US" b="1" u="sng" dirty="0">
-                      <a:solidFill>
-                        <a:srgbClr val="00B0F0"/>
-                      </a:solidFill>
-                    </a:rPr>
-                    <a:t>표준 규약</a:t>
-                  </a:r>
-                  <a:endParaRPr kumimoji="1" lang="en-US" altLang="ko-KR" b="1" u="sng" dirty="0">
-                    <a:solidFill>
-                      <a:srgbClr val="00B0F0"/>
-                    </a:solidFill>
-                  </a:endParaRPr>
-                </a:p>
-                <a:p>
-                  <a:pPr algn="ctr"/>
-                  <a:endParaRPr kumimoji="1" lang="en-US" altLang="ko-KR" sz="1600" dirty="0">
-                    <a:solidFill>
-                      <a:srgbClr val="00B0F0"/>
-                    </a:solidFill>
-                  </a:endParaRPr>
-                </a:p>
-                <a:p>
-                  <a:pPr algn="ctr"/>
-                  <a14:m>
-                    <m:oMathPara xmlns:m="http://schemas.openxmlformats.org/officeDocument/2006/math">
-                      <m:oMathParaPr>
-                        <m:jc m:val="centerGroup"/>
-                      </m:oMathParaPr>
-                      <m:oMath xmlns:m="http://schemas.openxmlformats.org/officeDocument/2006/math">
-                        <m:r>
-                          <a:rPr kumimoji="1" lang="en-US" altLang="ko-KR" sz="1600" i="1" smtClean="0">
-                            <a:solidFill>
-                              <a:schemeClr val="tx1"/>
-                            </a:solidFill>
-                            <a:latin typeface="Cambria Math" panose="02040503050406030204" pitchFamily="18" charset="0"/>
-                            <a:ea typeface="Cambria Math" panose="02040503050406030204" pitchFamily="18" charset="0"/>
-                          </a:rPr>
-                          <m:t>↓</m:t>
-                        </m:r>
-                      </m:oMath>
-                    </m:oMathPara>
-                  </a14:m>
-                  <a:endParaRPr kumimoji="1" lang="en-US" altLang="ko-KR" sz="1600" dirty="0">
-                    <a:solidFill>
-                      <a:schemeClr val="tx1"/>
-                    </a:solidFill>
-                    <a:ea typeface="Cambria Math" panose="02040503050406030204" pitchFamily="18" charset="0"/>
-                  </a:endParaRPr>
-                </a:p>
-                <a:p>
-                  <a:pPr algn="ctr"/>
-                  <a:endParaRPr kumimoji="1" lang="en-US" altLang="ko-KR" sz="1600" dirty="0">
-                    <a:solidFill>
-                      <a:srgbClr val="00B0F0"/>
-                    </a:solidFill>
-                  </a:endParaRPr>
-                </a:p>
-                <a:p>
-                  <a:pPr algn="ctr"/>
-                  <a:r>
-                    <a:rPr kumimoji="1" lang="ko-KR" altLang="en-US" sz="1600" dirty="0">
-                      <a:solidFill>
-                        <a:srgbClr val="00B0F0"/>
-                      </a:solidFill>
-                    </a:rPr>
-                    <a:t>모바일</a:t>
-                  </a:r>
-                  <a:r>
-                    <a:rPr kumimoji="1" lang="en-US" altLang="ko-KR" sz="1600" dirty="0">
-                      <a:solidFill>
-                        <a:srgbClr val="00B0F0"/>
-                      </a:solidFill>
-                    </a:rPr>
-                    <a:t>, PC, </a:t>
-                  </a:r>
-                  <a:r>
-                    <a:rPr kumimoji="1" lang="ko-KR" altLang="en-US" sz="1600" dirty="0">
-                      <a:solidFill>
-                        <a:srgbClr val="00B0F0"/>
-                      </a:solidFill>
-                    </a:rPr>
-                    <a:t>등 </a:t>
-                  </a:r>
-                  <a:r>
-                    <a:rPr kumimoji="1" lang="ko-KR" altLang="en-US" sz="1600" u="sng" dirty="0">
-                      <a:solidFill>
-                        <a:srgbClr val="00B0F0"/>
-                      </a:solidFill>
-                    </a:rPr>
-                    <a:t>다양한 플랫폼 적용가능</a:t>
-                  </a:r>
-                  <a:endParaRPr kumimoji="1" lang="en-US" altLang="ko-KR" sz="1600" u="sng" dirty="0">
-                    <a:solidFill>
-                      <a:srgbClr val="00B0F0"/>
-                    </a:solidFill>
-                  </a:endParaRPr>
-                </a:p>
-              </p:txBody>
-            </p:sp>
-          </mc:Choice>
-          <mc:Fallback>
-            <p:sp>
-              <p:nvSpPr>
-                <p:cNvPr id="41" name="직사각형 40">
-                  <a:extLst>
-                    <a:ext uri="{FF2B5EF4-FFF2-40B4-BE49-F238E27FC236}">
-                      <a16:creationId xmlns:a16="http://schemas.microsoft.com/office/drawing/2014/main" id="{5274E6AC-7DE0-9048-9092-860FE50A401B}"/>
-                    </a:ext>
-                  </a:extLst>
-                </p:cNvPr>
-                <p:cNvSpPr>
-                  <a:spLocks noRot="1" noChangeAspect="1" noMove="1" noResize="1" noEditPoints="1" noAdjustHandles="1" noChangeArrowheads="1" noChangeShapeType="1" noTextEdit="1"/>
-                </p:cNvSpPr>
-                <p:nvPr/>
-              </p:nvSpPr>
-              <p:spPr>
-                <a:xfrm>
-                  <a:off x="8709650" y="4504642"/>
-                  <a:ext cx="1741494" cy="2263893"/>
-                </a:xfrm>
-                <a:prstGeom prst="rect">
-                  <a:avLst/>
-                </a:prstGeom>
-                <a:blipFill>
-                  <a:blip r:embed="rId2"/>
-                  <a:stretch>
-                    <a:fillRect/>
-                  </a:stretch>
-                </a:blipFill>
-                <a:ln w="28575">
+                </a:rPr>
+                <a:t>http://</a:t>
+              </a:r>
+              <a:r>
+                <a:rPr lang="en" altLang="ko-KR" sz="1400" dirty="0" err="1">
                   <a:solidFill>
                     <a:srgbClr val="00B0F0"/>
                   </a:solidFill>
-                </a:ln>
-              </p:spPr>
-              <p:txBody>
-                <a:bodyPr/>
-                <a:lstStyle/>
-                <a:p>
-                  <a:r>
-                    <a:rPr lang="ko-KR" altLang="en-US">
-                      <a:noFill/>
-                    </a:rPr>
-                    <a:t> </a:t>
-                  </a:r>
-                </a:p>
-              </p:txBody>
-            </p:sp>
-          </mc:Fallback>
-        </mc:AlternateContent>
+                </a:rPr>
+                <a:t>api.openweathermap.org</a:t>
+              </a:r>
+              <a:r>
+                <a:rPr lang="en" altLang="ko-KR" sz="1400" dirty="0">
+                  <a:solidFill>
+                    <a:srgbClr val="00B0F0"/>
+                  </a:solidFill>
+                </a:rPr>
+                <a:t>/data/2.5/weather</a:t>
+              </a:r>
+              <a:endParaRPr kumimoji="1" lang="en-US" altLang="ko-KR" sz="1200" u="sng" dirty="0">
+                <a:solidFill>
+                  <a:srgbClr val="00B0F0"/>
+                </a:solidFill>
+              </a:endParaRPr>
+            </a:p>
+          </p:txBody>
+        </p:sp>
       </p:grpSp>
+      <p:pic>
+        <p:nvPicPr>
+          <p:cNvPr id="22" name="99E95D3C5B0B4A9608.png" descr="99E95D3C5B0B4A9608.png">
+            <a:extLst>
+              <a:ext uri="{FF2B5EF4-FFF2-40B4-BE49-F238E27FC236}">
+                <a16:creationId xmlns:a16="http://schemas.microsoft.com/office/drawing/2014/main" id="{7F0CFF7E-8609-FE40-88F9-FA0C8BB843D6}"/>
+              </a:ext>
+            </a:extLst>
+          </p:cNvPr>
+          <p:cNvPicPr>
+            <a:picLocks noChangeAspect="1"/>
+          </p:cNvPicPr>
+          <p:nvPr/>
+        </p:nvPicPr>
+        <p:blipFill>
+          <a:blip r:embed="rId2"/>
+          <a:stretch>
+            <a:fillRect/>
+          </a:stretch>
+        </p:blipFill>
+        <p:spPr>
+          <a:xfrm>
+            <a:off x="9119128" y="2229870"/>
+            <a:ext cx="1703723" cy="1703724"/>
+          </a:xfrm>
+          <a:prstGeom prst="rect">
+            <a:avLst/>
+          </a:prstGeom>
+          <a:ln w="12700">
+            <a:miter lim="400000"/>
+          </a:ln>
+        </p:spPr>
+      </p:pic>
+      <p:sp>
+        <p:nvSpPr>
+          <p:cNvPr id="23" name="직사각형 22">
+            <a:extLst>
+              <a:ext uri="{FF2B5EF4-FFF2-40B4-BE49-F238E27FC236}">
+                <a16:creationId xmlns:a16="http://schemas.microsoft.com/office/drawing/2014/main" id="{2D8A4DE3-A007-D242-90B1-87606C82EF2F}"/>
+              </a:ext>
+            </a:extLst>
+          </p:cNvPr>
+          <p:cNvSpPr/>
+          <p:nvPr/>
+        </p:nvSpPr>
+        <p:spPr>
+          <a:xfrm>
+            <a:off x="3684099" y="4428382"/>
+            <a:ext cx="4816504" cy="2268536"/>
+          </a:xfrm>
+          <a:prstGeom prst="rect">
+            <a:avLst/>
+          </a:prstGeom>
+          <a:noFill/>
+          <a:ln w="38100">
+            <a:solidFill>
+              <a:srgbClr val="FF0000"/>
+            </a:solidFill>
+          </a:ln>
+        </p:spPr>
+        <p:style>
+          <a:lnRef idx="2">
+            <a:schemeClr val="accent1">
+              <a:shade val="50000"/>
+            </a:schemeClr>
+          </a:lnRef>
+          <a:fillRef idx="1">
+            <a:schemeClr val="accent1"/>
+          </a:fillRef>
+          <a:effectRef idx="0">
+            <a:schemeClr val="accent1"/>
+          </a:effectRef>
+          <a:fontRef idx="minor">
+            <a:schemeClr val="lt1"/>
+          </a:fontRef>
+        </p:style>
+        <p:txBody>
+          <a:bodyPr rtlCol="0" anchor="ctr"/>
+          <a:lstStyle/>
+          <a:p>
+            <a:pPr algn="ctr"/>
+            <a:endParaRPr kumimoji="1" lang="ko-KR" altLang="en-US" sz="2800" dirty="0">
+              <a:solidFill>
+                <a:schemeClr val="tx1"/>
+              </a:solidFill>
+            </a:endParaRPr>
+          </a:p>
+        </p:txBody>
+      </p:sp>
     </p:spTree>
     <p:extLst>
       <p:ext uri="{BB962C8B-B14F-4D97-AF65-F5344CB8AC3E}">

</xml_diff>